<commit_message>
reduced space for .pptx files
</commit_message>
<xml_diff>
--- a/docs/files/cikm2021.pptx
+++ b/docs/files/cikm2021.pptx
@@ -6716,7 +6716,7 @@
               <a:rPr lang="fr-CH" smtClean="0">
                 <a:latin typeface="Arial" panose="020B0604020202020204" pitchFamily="34" charset="0"/>
               </a:rPr>
-              <a:t>30.10.21</a:t>
+              <a:t>20.10.22</a:t>
             </a:fld>
             <a:endParaRPr lang="fr-CH" dirty="0">
               <a:latin typeface="Arial" panose="020B0604020202020204" pitchFamily="34" charset="0"/>
@@ -6894,7 +6894,7 @@
             <a:fld id="{F8103E42-5239-1A40-AD33-3EE7E9DDF5FD}" type="datetimeFigureOut">
               <a:rPr lang="fr-FR" smtClean="0"/>
               <a:pPr/>
-              <a:t>30/10/2021</a:t>
+              <a:t>20/10/2022</a:t>
             </a:fld>
             <a:endParaRPr lang="fr-FR" dirty="0"/>
           </a:p>
@@ -8761,7 +8761,13 @@
           <p:nvPr userDrawn="1"/>
         </p:nvPicPr>
         <p:blipFill>
-          <a:blip r:embed="rId2"/>
+          <a:blip r:embed="rId2" cstate="hqprint">
+            <a:extLst>
+              <a:ext uri="{28A0092B-C50C-407E-A947-70E740481C1C}">
+                <a14:useLocalDpi xmlns:a14="http://schemas.microsoft.com/office/drawing/2010/main"/>
+              </a:ext>
+            </a:extLst>
+          </a:blip>
           <a:stretch>
             <a:fillRect/>
           </a:stretch>
@@ -8845,7 +8851,13 @@
           <p:nvPr userDrawn="1"/>
         </p:nvPicPr>
         <p:blipFill>
-          <a:blip r:embed="rId3"/>
+          <a:blip r:embed="rId3" cstate="hqprint">
+            <a:extLst>
+              <a:ext uri="{28A0092B-C50C-407E-A947-70E740481C1C}">
+                <a14:useLocalDpi xmlns:a14="http://schemas.microsoft.com/office/drawing/2010/main"/>
+              </a:ext>
+            </a:extLst>
+          </a:blip>
           <a:stretch>
             <a:fillRect/>
           </a:stretch>
@@ -9361,7 +9373,13 @@
           <p:nvPr userDrawn="1"/>
         </p:nvPicPr>
         <p:blipFill>
-          <a:blip r:embed="rId5"/>
+          <a:blip r:embed="rId5" cstate="hqprint">
+            <a:extLst>
+              <a:ext uri="{28A0092B-C50C-407E-A947-70E740481C1C}">
+                <a14:useLocalDpi xmlns:a14="http://schemas.microsoft.com/office/drawing/2010/main"/>
+              </a:ext>
+            </a:extLst>
+          </a:blip>
           <a:stretch>
             <a:fillRect/>
           </a:stretch>
@@ -10349,7 +10367,7 @@
           <p:nvPr/>
         </p:nvPicPr>
         <p:blipFill>
-          <a:blip r:embed="rId3">
+          <a:blip r:embed="rId3" cstate="hqprint">
             <a:clrChange>
               <a:clrFrom>
                 <a:srgbClr val="FFFFFF"/>
@@ -10360,6 +10378,11 @@
                 </a:srgbClr>
               </a:clrTo>
             </a:clrChange>
+            <a:extLst>
+              <a:ext uri="{28A0092B-C50C-407E-A947-70E740481C1C}">
+                <a14:useLocalDpi xmlns:a14="http://schemas.microsoft.com/office/drawing/2010/main"/>
+              </a:ext>
+            </a:extLst>
           </a:blip>
           <a:stretch>
             <a:fillRect/>
@@ -13230,10 +13253,10 @@
           <p:nvPr/>
         </p:nvPicPr>
         <p:blipFill>
-          <a:blip r:embed="rId3">
+          <a:blip r:embed="rId3" cstate="hqprint">
             <a:extLst>
               <a:ext uri="{28A0092B-C50C-407E-A947-70E740481C1C}">
-                <a14:useLocalDpi xmlns:a14="http://schemas.microsoft.com/office/drawing/2010/main" val="0"/>
+                <a14:useLocalDpi xmlns:a14="http://schemas.microsoft.com/office/drawing/2010/main"/>
               </a:ext>
             </a:extLst>
           </a:blip>
@@ -13280,7 +13303,7 @@
           <a:blip r:embed="rId4">
             <a:extLst>
               <a:ext uri="{28A0092B-C50C-407E-A947-70E740481C1C}">
-                <a14:useLocalDpi xmlns:a14="http://schemas.microsoft.com/office/drawing/2010/main" val="0"/>
+                <a14:useLocalDpi xmlns:a14="http://schemas.microsoft.com/office/drawing/2010/main"/>
               </a:ext>
             </a:extLst>
           </a:blip>
@@ -13324,10 +13347,10 @@
           <p:nvPr/>
         </p:nvPicPr>
         <p:blipFill>
-          <a:blip r:embed="rId5">
+          <a:blip r:embed="rId5" cstate="hqprint">
             <a:extLst>
               <a:ext uri="{28A0092B-C50C-407E-A947-70E740481C1C}">
-                <a14:useLocalDpi xmlns:a14="http://schemas.microsoft.com/office/drawing/2010/main" val="0"/>
+                <a14:useLocalDpi xmlns:a14="http://schemas.microsoft.com/office/drawing/2010/main"/>
               </a:ext>
             </a:extLst>
           </a:blip>
@@ -14430,7 +14453,7 @@
             <p:nvPr/>
           </p:nvPicPr>
           <p:blipFill rotWithShape="1">
-            <a:blip r:embed="rId3">
+            <a:blip r:embed="rId3" cstate="hqprint">
               <a:clrChange>
                 <a:clrFrom>
                   <a:srgbClr val="FFFFFF"/>
@@ -14443,11 +14466,11 @@
               </a:clrChange>
               <a:extLst>
                 <a:ext uri="{28A0092B-C50C-407E-A947-70E740481C1C}">
-                  <a14:useLocalDpi xmlns:a14="http://schemas.microsoft.com/office/drawing/2010/main" val="0"/>
+                  <a14:useLocalDpi xmlns:a14="http://schemas.microsoft.com/office/drawing/2010/main"/>
                 </a:ext>
               </a:extLst>
             </a:blip>
-            <a:srcRect t="15541" b="15541"/>
+            <a:srcRect/>
             <a:stretch/>
           </p:blipFill>
           <p:spPr bwMode="auto">
@@ -14580,10 +14603,10 @@
             <p:nvPr/>
           </p:nvPicPr>
           <p:blipFill>
-            <a:blip r:embed="rId4">
+            <a:blip r:embed="rId4" cstate="hqprint">
               <a:extLst>
                 <a:ext uri="{28A0092B-C50C-407E-A947-70E740481C1C}">
-                  <a14:useLocalDpi xmlns:a14="http://schemas.microsoft.com/office/drawing/2010/main" val="0"/>
+                  <a14:useLocalDpi xmlns:a14="http://schemas.microsoft.com/office/drawing/2010/main"/>
                 </a:ext>
               </a:extLst>
             </a:blip>
@@ -14722,7 +14745,7 @@
             <p:nvPr/>
           </p:nvPicPr>
           <p:blipFill>
-            <a:blip r:embed="rId5">
+            <a:blip r:embed="rId5" cstate="hqprint">
               <a:clrChange>
                 <a:clrFrom>
                   <a:srgbClr val="D7EDE9"/>
@@ -14733,6 +14756,11 @@
                   </a:srgbClr>
                 </a:clrTo>
               </a:clrChange>
+              <a:extLst>
+                <a:ext uri="{28A0092B-C50C-407E-A947-70E740481C1C}">
+                  <a14:useLocalDpi xmlns:a14="http://schemas.microsoft.com/office/drawing/2010/main"/>
+                </a:ext>
+              </a:extLst>
             </a:blip>
             <a:stretch>
               <a:fillRect/>
@@ -14891,10 +14919,15 @@
             <p:nvPr/>
           </p:nvPicPr>
           <p:blipFill rotWithShape="1">
-            <a:blip r:embed="rId7">
+            <a:blip r:embed="rId7" cstate="hqprint">
               <a:alphaModFix/>
+              <a:extLst>
+                <a:ext uri="{28A0092B-C50C-407E-A947-70E740481C1C}">
+                  <a14:useLocalDpi xmlns:a14="http://schemas.microsoft.com/office/drawing/2010/main"/>
+                </a:ext>
+              </a:extLst>
             </a:blip>
-            <a:srcRect l="13498" r="13498"/>
+            <a:srcRect/>
             <a:stretch/>
           </p:blipFill>
           <p:spPr>
@@ -16178,8 +16211,13 @@
               <p:nvPr/>
             </p:nvPicPr>
             <p:blipFill rotWithShape="1">
-              <a:blip r:embed="rId3">
+              <a:blip r:embed="rId3" cstate="hqprint">
                 <a:alphaModFix/>
+                <a:extLst>
+                  <a:ext uri="{28A0092B-C50C-407E-A947-70E740481C1C}">
+                    <a14:useLocalDpi xmlns:a14="http://schemas.microsoft.com/office/drawing/2010/main"/>
+                  </a:ext>
+                </a:extLst>
               </a:blip>
               <a:srcRect/>
               <a:stretch/>
@@ -16205,8 +16243,13 @@
               <p:nvPr/>
             </p:nvPicPr>
             <p:blipFill rotWithShape="1">
-              <a:blip r:embed="rId3">
+              <a:blip r:embed="rId3" cstate="hqprint">
                 <a:alphaModFix/>
+                <a:extLst>
+                  <a:ext uri="{28A0092B-C50C-407E-A947-70E740481C1C}">
+                    <a14:useLocalDpi xmlns:a14="http://schemas.microsoft.com/office/drawing/2010/main"/>
+                  </a:ext>
+                </a:extLst>
               </a:blip>
               <a:srcRect/>
               <a:stretch/>
@@ -16232,8 +16275,13 @@
               <p:nvPr/>
             </p:nvPicPr>
             <p:blipFill rotWithShape="1">
-              <a:blip r:embed="rId3">
+              <a:blip r:embed="rId3" cstate="hqprint">
                 <a:alphaModFix/>
+                <a:extLst>
+                  <a:ext uri="{28A0092B-C50C-407E-A947-70E740481C1C}">
+                    <a14:useLocalDpi xmlns:a14="http://schemas.microsoft.com/office/drawing/2010/main"/>
+                  </a:ext>
+                </a:extLst>
               </a:blip>
               <a:srcRect/>
               <a:stretch/>
@@ -16274,8 +16322,13 @@
               <p:nvPr/>
             </p:nvPicPr>
             <p:blipFill rotWithShape="1">
-              <a:blip r:embed="rId4">
+              <a:blip r:embed="rId4" cstate="hqprint">
                 <a:alphaModFix/>
+                <a:extLst>
+                  <a:ext uri="{28A0092B-C50C-407E-A947-70E740481C1C}">
+                    <a14:useLocalDpi xmlns:a14="http://schemas.microsoft.com/office/drawing/2010/main"/>
+                  </a:ext>
+                </a:extLst>
               </a:blip>
               <a:srcRect/>
               <a:stretch/>
@@ -16301,8 +16354,13 @@
               <p:nvPr/>
             </p:nvPicPr>
             <p:blipFill rotWithShape="1">
-              <a:blip r:embed="rId4">
+              <a:blip r:embed="rId4" cstate="hqprint">
                 <a:alphaModFix/>
+                <a:extLst>
+                  <a:ext uri="{28A0092B-C50C-407E-A947-70E740481C1C}">
+                    <a14:useLocalDpi xmlns:a14="http://schemas.microsoft.com/office/drawing/2010/main"/>
+                  </a:ext>
+                </a:extLst>
               </a:blip>
               <a:srcRect/>
               <a:stretch/>
@@ -16370,8 +16428,13 @@
               <p:nvPr/>
             </p:nvPicPr>
             <p:blipFill rotWithShape="1">
-              <a:blip r:embed="rId6">
+              <a:blip r:embed="rId6" cstate="hqprint">
                 <a:alphaModFix/>
+                <a:extLst>
+                  <a:ext uri="{28A0092B-C50C-407E-A947-70E740481C1C}">
+                    <a14:useLocalDpi xmlns:a14="http://schemas.microsoft.com/office/drawing/2010/main"/>
+                  </a:ext>
+                </a:extLst>
               </a:blip>
               <a:srcRect/>
               <a:stretch/>
@@ -16397,8 +16460,13 @@
               <p:nvPr/>
             </p:nvPicPr>
             <p:blipFill rotWithShape="1">
-              <a:blip r:embed="rId7">
+              <a:blip r:embed="rId7" cstate="hqprint">
                 <a:alphaModFix/>
+                <a:extLst>
+                  <a:ext uri="{28A0092B-C50C-407E-A947-70E740481C1C}">
+                    <a14:useLocalDpi xmlns:a14="http://schemas.microsoft.com/office/drawing/2010/main"/>
+                  </a:ext>
+                </a:extLst>
               </a:blip>
               <a:srcRect/>
               <a:stretch/>
@@ -17477,7 +17545,7 @@
             <p:nvPr/>
           </p:nvPicPr>
           <p:blipFill>
-            <a:blip r:embed="rId3">
+            <a:blip r:embed="rId3" cstate="hqprint">
               <a:duotone>
                 <a:srgbClr val="5E5E5E">
                   <a:shade val="45000"/>
@@ -17485,6 +17553,11 @@
                 </a:srgbClr>
                 <a:prstClr val="white"/>
               </a:duotone>
+              <a:extLst>
+                <a:ext uri="{28A0092B-C50C-407E-A947-70E740481C1C}">
+                  <a14:useLocalDpi xmlns:a14="http://schemas.microsoft.com/office/drawing/2010/main"/>
+                </a:ext>
+              </a:extLst>
             </a:blip>
             <a:srcRect/>
             <a:stretch/>
@@ -17516,7 +17589,7 @@
             <p:nvPr/>
           </p:nvPicPr>
           <p:blipFill>
-            <a:blip r:embed="rId3">
+            <a:blip r:embed="rId3" cstate="hqprint">
               <a:duotone>
                 <a:srgbClr val="5E5E5E">
                   <a:shade val="45000"/>
@@ -17524,6 +17597,11 @@
                 </a:srgbClr>
                 <a:prstClr val="white"/>
               </a:duotone>
+              <a:extLst>
+                <a:ext uri="{28A0092B-C50C-407E-A947-70E740481C1C}">
+                  <a14:useLocalDpi xmlns:a14="http://schemas.microsoft.com/office/drawing/2010/main"/>
+                </a:ext>
+              </a:extLst>
             </a:blip>
             <a:srcRect/>
             <a:stretch/>
@@ -17555,7 +17633,7 @@
             <p:nvPr/>
           </p:nvPicPr>
           <p:blipFill>
-            <a:blip r:embed="rId3">
+            <a:blip r:embed="rId3" cstate="hqprint">
               <a:duotone>
                 <a:srgbClr val="5E5E5E">
                   <a:shade val="45000"/>
@@ -17563,6 +17641,11 @@
                 </a:srgbClr>
                 <a:prstClr val="white"/>
               </a:duotone>
+              <a:extLst>
+                <a:ext uri="{28A0092B-C50C-407E-A947-70E740481C1C}">
+                  <a14:useLocalDpi xmlns:a14="http://schemas.microsoft.com/office/drawing/2010/main"/>
+                </a:ext>
+              </a:extLst>
             </a:blip>
             <a:srcRect/>
             <a:stretch/>
@@ -17594,7 +17677,7 @@
             <p:nvPr/>
           </p:nvPicPr>
           <p:blipFill>
-            <a:blip r:embed="rId4">
+            <a:blip r:embed="rId4" cstate="hqprint">
               <a:duotone>
                 <a:srgbClr val="5E5E5E">
                   <a:shade val="45000"/>
@@ -17602,6 +17685,11 @@
                 </a:srgbClr>
                 <a:prstClr val="white"/>
               </a:duotone>
+              <a:extLst>
+                <a:ext uri="{28A0092B-C50C-407E-A947-70E740481C1C}">
+                  <a14:useLocalDpi xmlns:a14="http://schemas.microsoft.com/office/drawing/2010/main"/>
+                </a:ext>
+              </a:extLst>
             </a:blip>
             <a:srcRect/>
             <a:stretch/>
@@ -17633,7 +17721,7 @@
             <p:nvPr/>
           </p:nvPicPr>
           <p:blipFill>
-            <a:blip r:embed="rId5">
+            <a:blip r:embed="rId5" cstate="hqprint">
               <a:duotone>
                 <a:srgbClr val="5E5E5E">
                   <a:shade val="45000"/>
@@ -17641,6 +17729,11 @@
                 </a:srgbClr>
                 <a:prstClr val="white"/>
               </a:duotone>
+              <a:extLst>
+                <a:ext uri="{28A0092B-C50C-407E-A947-70E740481C1C}">
+                  <a14:useLocalDpi xmlns:a14="http://schemas.microsoft.com/office/drawing/2010/main"/>
+                </a:ext>
+              </a:extLst>
             </a:blip>
             <a:srcRect/>
             <a:stretch/>
@@ -19435,7 +19528,7 @@
           <p:nvPr/>
         </p:nvPicPr>
         <p:blipFill>
-          <a:blip r:embed="rId3">
+          <a:blip r:embed="rId3" cstate="hqprint">
             <a:clrChange>
               <a:clrFrom>
                 <a:srgbClr val="FFFFFF"/>
@@ -19446,6 +19539,11 @@
                 </a:srgbClr>
               </a:clrTo>
             </a:clrChange>
+            <a:extLst>
+              <a:ext uri="{28A0092B-C50C-407E-A947-70E740481C1C}">
+                <a14:useLocalDpi xmlns:a14="http://schemas.microsoft.com/office/drawing/2010/main"/>
+              </a:ext>
+            </a:extLst>
           </a:blip>
           <a:stretch>
             <a:fillRect/>
@@ -20094,7 +20192,7 @@
                   <p:nvPr/>
                 </p:nvPicPr>
                 <p:blipFill>
-                  <a:blip r:embed="rId3">
+                  <a:blip r:embed="rId3" cstate="hqprint">
                     <a:duotone>
                       <a:srgbClr val="418AB3">
                         <a:shade val="45000"/>
@@ -20102,6 +20200,11 @@
                       </a:srgbClr>
                       <a:prstClr val="white"/>
                     </a:duotone>
+                    <a:extLst>
+                      <a:ext uri="{28A0092B-C50C-407E-A947-70E740481C1C}">
+                        <a14:useLocalDpi xmlns:a14="http://schemas.microsoft.com/office/drawing/2010/main"/>
+                      </a:ext>
+                    </a:extLst>
                   </a:blip>
                   <a:srcRect/>
                   <a:stretch/>
@@ -20133,7 +20236,7 @@
                   <p:nvPr/>
                 </p:nvPicPr>
                 <p:blipFill>
-                  <a:blip r:embed="rId3">
+                  <a:blip r:embed="rId3" cstate="hqprint">
                     <a:duotone>
                       <a:srgbClr val="418AB3">
                         <a:shade val="45000"/>
@@ -20141,6 +20244,11 @@
                       </a:srgbClr>
                       <a:prstClr val="white"/>
                     </a:duotone>
+                    <a:extLst>
+                      <a:ext uri="{28A0092B-C50C-407E-A947-70E740481C1C}">
+                        <a14:useLocalDpi xmlns:a14="http://schemas.microsoft.com/office/drawing/2010/main"/>
+                      </a:ext>
+                    </a:extLst>
                   </a:blip>
                   <a:srcRect/>
                   <a:stretch/>
@@ -20173,7 +20281,7 @@
                 <p:nvPr/>
               </p:nvPicPr>
               <p:blipFill>
-                <a:blip r:embed="rId4">
+                <a:blip r:embed="rId4" cstate="hqprint">
                   <a:duotone>
                     <a:srgbClr val="418AB3">
                       <a:shade val="45000"/>
@@ -20181,6 +20289,11 @@
                     </a:srgbClr>
                     <a:prstClr val="white"/>
                   </a:duotone>
+                  <a:extLst>
+                    <a:ext uri="{28A0092B-C50C-407E-A947-70E740481C1C}">
+                      <a14:useLocalDpi xmlns:a14="http://schemas.microsoft.com/office/drawing/2010/main"/>
+                    </a:ext>
+                  </a:extLst>
                 </a:blip>
                 <a:srcRect/>
                 <a:stretch/>
@@ -20347,7 +20460,7 @@
                 <p:nvPr/>
               </p:nvPicPr>
               <p:blipFill>
-                <a:blip r:embed="rId3">
+                <a:blip r:embed="rId3" cstate="hqprint">
                   <a:duotone>
                     <a:srgbClr val="A6B727">
                       <a:shade val="45000"/>
@@ -20355,6 +20468,11 @@
                     </a:srgbClr>
                     <a:prstClr val="white"/>
                   </a:duotone>
+                  <a:extLst>
+                    <a:ext uri="{28A0092B-C50C-407E-A947-70E740481C1C}">
+                      <a14:useLocalDpi xmlns:a14="http://schemas.microsoft.com/office/drawing/2010/main"/>
+                    </a:ext>
+                  </a:extLst>
                 </a:blip>
                 <a:srcRect/>
                 <a:stretch/>
@@ -20406,7 +20524,7 @@
                   <p:nvPr/>
                 </p:nvPicPr>
                 <p:blipFill rotWithShape="1">
-                  <a:blip r:embed="rId4">
+                  <a:blip r:embed="rId5" cstate="hqprint">
                     <a:duotone>
                       <a:srgbClr val="A6B727">
                         <a:shade val="45000"/>
@@ -20414,6 +20532,11 @@
                       </a:srgbClr>
                       <a:prstClr val="white"/>
                     </a:duotone>
+                    <a:extLst>
+                      <a:ext uri="{28A0092B-C50C-407E-A947-70E740481C1C}">
+                        <a14:useLocalDpi xmlns:a14="http://schemas.microsoft.com/office/drawing/2010/main"/>
+                      </a:ext>
+                    </a:extLst>
                   </a:blip>
                   <a:srcRect/>
                   <a:stretch/>
@@ -20445,7 +20568,7 @@
                   <p:nvPr/>
                 </p:nvPicPr>
                 <p:blipFill>
-                  <a:blip r:embed="rId4">
+                  <a:blip r:embed="rId5" cstate="hqprint">
                     <a:duotone>
                       <a:srgbClr val="A6B727">
                         <a:shade val="45000"/>
@@ -20453,6 +20576,11 @@
                       </a:srgbClr>
                       <a:prstClr val="white"/>
                     </a:duotone>
+                    <a:extLst>
+                      <a:ext uri="{28A0092B-C50C-407E-A947-70E740481C1C}">
+                        <a14:useLocalDpi xmlns:a14="http://schemas.microsoft.com/office/drawing/2010/main"/>
+                      </a:ext>
+                    </a:extLst>
                   </a:blip>
                   <a:srcRect/>
                   <a:stretch/>
@@ -20838,7 +20966,13 @@
           <p:nvPr/>
         </p:nvPicPr>
         <p:blipFill>
-          <a:blip r:embed="rId3"/>
+          <a:blip r:embed="rId3" cstate="hqprint">
+            <a:extLst>
+              <a:ext uri="{28A0092B-C50C-407E-A947-70E740481C1C}">
+                <a14:useLocalDpi xmlns:a14="http://schemas.microsoft.com/office/drawing/2010/main"/>
+              </a:ext>
+            </a:extLst>
+          </a:blip>
           <a:srcRect/>
           <a:stretch/>
         </p:blipFill>
@@ -20867,7 +21001,7 @@
           <p:nvPr/>
         </p:nvPicPr>
         <p:blipFill>
-          <a:blip r:embed="rId4">
+          <a:blip r:embed="rId4" cstate="hqprint">
             <a:clrChange>
               <a:clrFrom>
                 <a:srgbClr val="FFFFFF"/>
@@ -20878,6 +21012,11 @@
                 </a:srgbClr>
               </a:clrTo>
             </a:clrChange>
+            <a:extLst>
+              <a:ext uri="{28A0092B-C50C-407E-A947-70E740481C1C}">
+                <a14:useLocalDpi xmlns:a14="http://schemas.microsoft.com/office/drawing/2010/main"/>
+              </a:ext>
+            </a:extLst>
           </a:blip>
           <a:stretch>
             <a:fillRect/>
@@ -22084,6 +22223,41 @@
 </file>
 
 <file path=customXml/item1.xml><?xml version="1.0" encoding="utf-8"?>
+<?mso-contentType ?>
+<FormTemplates xmlns="http://schemas.microsoft.com/sharepoint/v3/contenttype/forms">
+  <Display>DocumentLibraryForm</Display>
+  <Edit>DocumentLibraryForm</Edit>
+  <New>DocumentLibraryForm</New>
+</FormTemplates>
+</file>
+
+<file path=customXml/item2.xml><?xml version="1.0" encoding="utf-8"?>
+<p:properties xmlns:p="http://schemas.microsoft.com/office/2006/metadata/properties" xmlns:xsi="http://www.w3.org/2001/XMLSchema-instance" xmlns:pc="http://schemas.microsoft.com/office/infopath/2007/PartnerControls">
+  <documentManagement>
+    <EPFLAuthor xmlns="366578e5-d8fa-4ca3-80b4-96d4f4020af2">
+      <UserInfo>
+        <DisplayName/>
+        <AccountId xsi:nil="true"/>
+        <AccountType/>
+      </UserInfo>
+    </EPFLAuthor>
+    <a822da24a7be47f7b2b8d6471b611ecd xmlns="366578e5-d8fa-4ca3-80b4-96d4f4020af2">
+      <Terms xmlns="http://schemas.microsoft.com/office/infopath/2007/PartnerControls">
+        <TermInfo xmlns="http://schemas.microsoft.com/office/infopath/2007/PartnerControls">
+          <TermName xmlns="http://schemas.microsoft.com/office/infopath/2007/PartnerControls">Public</TermName>
+          <TermId xmlns="http://schemas.microsoft.com/office/infopath/2007/PartnerControls">bed90794-060d-40e3-8efd-fc84c2f09e8f</TermId>
+        </TermInfo>
+      </Terms>
+    </a822da24a7be47f7b2b8d6471b611ecd>
+    <EPFLUsageTaxHTField0 xmlns="366578e5-d8fa-4ca3-80b4-96d4f4020af2" xsi:nil="true"/>
+    <TaxCatchAll xmlns="505a1229-fefc-4964-aa43-a843a2e4cec8">
+      <Value>1</Value>
+    </TaxCatchAll>
+  </documentManagement>
+</p:properties>
+</file>
+
+<file path=customXml/item3.xml><?xml version="1.0" encoding="utf-8"?>
 <ct:contentTypeSchema xmlns:ct="http://schemas.microsoft.com/office/2006/metadata/contentType" xmlns:ma="http://schemas.microsoft.com/office/2006/metadata/properties/metaAttributes" ct:_="" ma:_="" ma:contentTypeName="EPFL Document" ma:contentTypeID="0x0101009E359B892F0745A488A3BA50FA95E220008D12AA6DD8705844A8F440FB2627C65C" ma:contentTypeVersion="2" ma:contentTypeDescription="Base Content Type for all EPFL documents" ma:contentTypeScope="" ma:versionID="243fe3aa2b7702eb0a8fc0aba44d7aac">
   <xsd:schema xmlns:xsd="http://www.w3.org/2001/XMLSchema" xmlns:xs="http://www.w3.org/2001/XMLSchema" xmlns:p="http://schemas.microsoft.com/office/2006/metadata/properties" xmlns:ns2="366578e5-d8fa-4ca3-80b4-96d4f4020af2" xmlns:ns3="505a1229-fefc-4964-aa43-a843a2e4cec8" targetNamespace="http://schemas.microsoft.com/office/2006/metadata/properties" ma:root="true" ma:fieldsID="874849853f62a370529474de8c246750" ns2:_="" ns3:_="">
     <xsd:import namespace="366578e5-d8fa-4ca3-80b4-96d4f4020af2"/>
@@ -22254,42 +22428,26 @@
 </ct:contentTypeSchema>
 </file>
 
-<file path=customXml/item2.xml><?xml version="1.0" encoding="utf-8"?>
-<p:properties xmlns:p="http://schemas.microsoft.com/office/2006/metadata/properties" xmlns:xsi="http://www.w3.org/2001/XMLSchema-instance" xmlns:pc="http://schemas.microsoft.com/office/infopath/2007/PartnerControls">
-  <documentManagement>
-    <EPFLAuthor xmlns="366578e5-d8fa-4ca3-80b4-96d4f4020af2">
-      <UserInfo>
-        <DisplayName/>
-        <AccountId xsi:nil="true"/>
-        <AccountType/>
-      </UserInfo>
-    </EPFLAuthor>
-    <a822da24a7be47f7b2b8d6471b611ecd xmlns="366578e5-d8fa-4ca3-80b4-96d4f4020af2">
-      <Terms xmlns="http://schemas.microsoft.com/office/infopath/2007/PartnerControls">
-        <TermInfo xmlns="http://schemas.microsoft.com/office/infopath/2007/PartnerControls">
-          <TermName xmlns="http://schemas.microsoft.com/office/infopath/2007/PartnerControls">Public</TermName>
-          <TermId xmlns="http://schemas.microsoft.com/office/infopath/2007/PartnerControls">bed90794-060d-40e3-8efd-fc84c2f09e8f</TermId>
-        </TermInfo>
-      </Terms>
-    </a822da24a7be47f7b2b8d6471b611ecd>
-    <EPFLUsageTaxHTField0 xmlns="366578e5-d8fa-4ca3-80b4-96d4f4020af2" xsi:nil="true"/>
-    <TaxCatchAll xmlns="505a1229-fefc-4964-aa43-a843a2e4cec8">
-      <Value>1</Value>
-    </TaxCatchAll>
-  </documentManagement>
-</p:properties>
+<file path=customXml/itemProps1.xml><?xml version="1.0" encoding="utf-8"?>
+<ds:datastoreItem xmlns:ds="http://schemas.openxmlformats.org/officeDocument/2006/customXml" ds:itemID="{B6EC99A6-5E64-4A2A-9ABF-C3A21F434FEC}">
+  <ds:schemaRefs>
+    <ds:schemaRef ds:uri="http://schemas.microsoft.com/sharepoint/v3/contenttype/forms"/>
+  </ds:schemaRefs>
+</ds:datastoreItem>
 </file>
 
-<file path=customXml/item3.xml><?xml version="1.0" encoding="utf-8"?>
-<?mso-contentType ?>
-<FormTemplates xmlns="http://schemas.microsoft.com/sharepoint/v3/contenttype/forms">
-  <Display>DocumentLibraryForm</Display>
-  <Edit>DocumentLibraryForm</Edit>
-  <New>DocumentLibraryForm</New>
-</FormTemplates>
+<file path=customXml/itemProps2.xml><?xml version="1.0" encoding="utf-8"?>
+<ds:datastoreItem xmlns:ds="http://schemas.openxmlformats.org/officeDocument/2006/customXml" ds:itemID="{79A7CB31-E4DC-4063-BDCD-36DC5F1DA1C8}">
+  <ds:schemaRefs>
+    <ds:schemaRef ds:uri="http://schemas.microsoft.com/office/2006/metadata/properties"/>
+    <ds:schemaRef ds:uri="http://schemas.microsoft.com/office/infopath/2007/PartnerControls"/>
+    <ds:schemaRef ds:uri="366578e5-d8fa-4ca3-80b4-96d4f4020af2"/>
+    <ds:schemaRef ds:uri="505a1229-fefc-4964-aa43-a843a2e4cec8"/>
+  </ds:schemaRefs>
+</ds:datastoreItem>
 </file>
 
-<file path=customXml/itemProps1.xml><?xml version="1.0" encoding="utf-8"?>
+<file path=customXml/itemProps3.xml><?xml version="1.0" encoding="utf-8"?>
 <ds:datastoreItem xmlns:ds="http://schemas.openxmlformats.org/officeDocument/2006/customXml" ds:itemID="{E83F701F-4DB5-423A-8196-014F59782003}">
   <ds:schemaRefs>
     <ds:schemaRef ds:uri="http://schemas.microsoft.com/office/2006/metadata/contentType"/>
@@ -22306,23 +22464,4 @@
     <ds:schemaRef ds:uri="http://schemas.microsoft.com/internal/obd"/>
   </ds:schemaRefs>
 </ds:datastoreItem>
-</file>
-
-<file path=customXml/itemProps2.xml><?xml version="1.0" encoding="utf-8"?>
-<ds:datastoreItem xmlns:ds="http://schemas.openxmlformats.org/officeDocument/2006/customXml" ds:itemID="{79A7CB31-E4DC-4063-BDCD-36DC5F1DA1C8}">
-  <ds:schemaRefs>
-    <ds:schemaRef ds:uri="http://schemas.microsoft.com/office/2006/metadata/properties"/>
-    <ds:schemaRef ds:uri="http://schemas.microsoft.com/office/infopath/2007/PartnerControls"/>
-    <ds:schemaRef ds:uri="366578e5-d8fa-4ca3-80b4-96d4f4020af2"/>
-    <ds:schemaRef ds:uri="505a1229-fefc-4964-aa43-a843a2e4cec8"/>
-  </ds:schemaRefs>
-</ds:datastoreItem>
-</file>
-
-<file path=customXml/itemProps3.xml><?xml version="1.0" encoding="utf-8"?>
-<ds:datastoreItem xmlns:ds="http://schemas.openxmlformats.org/officeDocument/2006/customXml" ds:itemID="{B6EC99A6-5E64-4A2A-9ABF-C3A21F434FEC}">
-  <ds:schemaRefs>
-    <ds:schemaRef ds:uri="http://schemas.microsoft.com/sharepoint/v3/contenttype/forms"/>
-  </ds:schemaRefs>
-</ds:datastoreItem>
 </file>
</xml_diff>